<commit_message>
add dev design note
</commit_message>
<xml_diff>
--- a/design/design.pptx
+++ b/design/design.pptx
@@ -6,6 +6,8 @@
   </p:sldMasterIdLst>
   <p:sldIdLst>
     <p:sldId id="256" r:id="rId2"/>
+    <p:sldId id="258" r:id="rId3"/>
+    <p:sldId id="257" r:id="rId4"/>
   </p:sldIdLst>
   <p:sldSz cx="12192000" cy="6858000"/>
   <p:notesSz cx="6858000" cy="9144000"/>
@@ -104,6 +106,11 @@
       </a:defRPr>
     </a:lvl9pPr>
   </p:defaultTextStyle>
+  <p:extLst>
+    <p:ext uri="{EFAFB233-063F-42B5-8137-9DF3F51BA10A}">
+      <p15:sldGuideLst xmlns:p15="http://schemas.microsoft.com/office/powerpoint/2012/main"/>
+    </p:ext>
+  </p:extLst>
 </p:presentation>
 </file>
 
@@ -238,7 +245,7 @@
           <a:p>
             <a:fld id="{B707E1E2-11D8-44CA-8A37-1317D29BCE36}" type="datetimeFigureOut">
               <a:rPr lang="en-US" smtClean="0"/>
-              <a:t>4/4/2018</a:t>
+              <a:t>4/13/2018</a:t>
             </a:fld>
             <a:endParaRPr lang="en-US"/>
           </a:p>
@@ -408,7 +415,7 @@
           <a:p>
             <a:fld id="{B707E1E2-11D8-44CA-8A37-1317D29BCE36}" type="datetimeFigureOut">
               <a:rPr lang="en-US" smtClean="0"/>
-              <a:t>4/4/2018</a:t>
+              <a:t>4/13/2018</a:t>
             </a:fld>
             <a:endParaRPr lang="en-US"/>
           </a:p>
@@ -588,7 +595,7 @@
           <a:p>
             <a:fld id="{B707E1E2-11D8-44CA-8A37-1317D29BCE36}" type="datetimeFigureOut">
               <a:rPr lang="en-US" smtClean="0"/>
-              <a:t>4/4/2018</a:t>
+              <a:t>4/13/2018</a:t>
             </a:fld>
             <a:endParaRPr lang="en-US"/>
           </a:p>
@@ -758,7 +765,7 @@
           <a:p>
             <a:fld id="{B707E1E2-11D8-44CA-8A37-1317D29BCE36}" type="datetimeFigureOut">
               <a:rPr lang="en-US" smtClean="0"/>
-              <a:t>4/4/2018</a:t>
+              <a:t>4/13/2018</a:t>
             </a:fld>
             <a:endParaRPr lang="en-US"/>
           </a:p>
@@ -1004,7 +1011,7 @@
           <a:p>
             <a:fld id="{B707E1E2-11D8-44CA-8A37-1317D29BCE36}" type="datetimeFigureOut">
               <a:rPr lang="en-US" smtClean="0"/>
-              <a:t>4/4/2018</a:t>
+              <a:t>4/13/2018</a:t>
             </a:fld>
             <a:endParaRPr lang="en-US"/>
           </a:p>
@@ -1236,7 +1243,7 @@
           <a:p>
             <a:fld id="{B707E1E2-11D8-44CA-8A37-1317D29BCE36}" type="datetimeFigureOut">
               <a:rPr lang="en-US" smtClean="0"/>
-              <a:t>4/4/2018</a:t>
+              <a:t>4/13/2018</a:t>
             </a:fld>
             <a:endParaRPr lang="en-US"/>
           </a:p>
@@ -1603,7 +1610,7 @@
           <a:p>
             <a:fld id="{B707E1E2-11D8-44CA-8A37-1317D29BCE36}" type="datetimeFigureOut">
               <a:rPr lang="en-US" smtClean="0"/>
-              <a:t>4/4/2018</a:t>
+              <a:t>4/13/2018</a:t>
             </a:fld>
             <a:endParaRPr lang="en-US"/>
           </a:p>
@@ -1721,7 +1728,7 @@
           <a:p>
             <a:fld id="{B707E1E2-11D8-44CA-8A37-1317D29BCE36}" type="datetimeFigureOut">
               <a:rPr lang="en-US" smtClean="0"/>
-              <a:t>4/4/2018</a:t>
+              <a:t>4/13/2018</a:t>
             </a:fld>
             <a:endParaRPr lang="en-US"/>
           </a:p>
@@ -1816,7 +1823,7 @@
           <a:p>
             <a:fld id="{B707E1E2-11D8-44CA-8A37-1317D29BCE36}" type="datetimeFigureOut">
               <a:rPr lang="en-US" smtClean="0"/>
-              <a:t>4/4/2018</a:t>
+              <a:t>4/13/2018</a:t>
             </a:fld>
             <a:endParaRPr lang="en-US"/>
           </a:p>
@@ -2093,7 +2100,7 @@
           <a:p>
             <a:fld id="{B707E1E2-11D8-44CA-8A37-1317D29BCE36}" type="datetimeFigureOut">
               <a:rPr lang="en-US" smtClean="0"/>
-              <a:t>4/4/2018</a:t>
+              <a:t>4/13/2018</a:t>
             </a:fld>
             <a:endParaRPr lang="en-US"/>
           </a:p>
@@ -2346,7 +2353,7 @@
           <a:p>
             <a:fld id="{B707E1E2-11D8-44CA-8A37-1317D29BCE36}" type="datetimeFigureOut">
               <a:rPr lang="en-US" smtClean="0"/>
-              <a:t>4/4/2018</a:t>
+              <a:t>4/13/2018</a:t>
             </a:fld>
             <a:endParaRPr lang="en-US"/>
           </a:p>
@@ -2559,7 +2566,7 @@
           <a:p>
             <a:fld id="{B707E1E2-11D8-44CA-8A37-1317D29BCE36}" type="datetimeFigureOut">
               <a:rPr lang="en-US" smtClean="0"/>
-              <a:t>4/4/2018</a:t>
+              <a:t>4/13/2018</a:t>
             </a:fld>
             <a:endParaRPr lang="en-US"/>
           </a:p>
@@ -2966,14 +2973,14 @@
       </p:grpSpPr>
       <p:sp>
         <p:nvSpPr>
-          <p:cNvPr id="4" name="矩形 3"/>
+          <p:cNvPr id="2" name="矩形 1"/>
           <p:cNvSpPr/>
           <p:nvPr/>
         </p:nvSpPr>
         <p:spPr>
           <a:xfrm>
-            <a:off x="870858" y="1026369"/>
-            <a:ext cx="1374710" cy="510073"/>
+            <a:off x="950615" y="2218099"/>
+            <a:ext cx="2716040" cy="1140736"/>
           </a:xfrm>
           <a:prstGeom prst="rect">
             <a:avLst/>
@@ -3002,7 +3009,7 @@
             <a:pPr algn="ctr"/>
             <a:r>
               <a:rPr lang="en-US" dirty="0" smtClean="0"/>
-              <a:t>project</a:t>
+              <a:t>index</a:t>
             </a:r>
             <a:endParaRPr lang="en-US" dirty="0"/>
           </a:p>
@@ -3010,14 +3017,97 @@
       </p:sp>
       <p:sp>
         <p:nvSpPr>
-          <p:cNvPr id="5" name="矩形 4"/>
+          <p:cNvPr id="3" name="标题 2"/>
+          <p:cNvSpPr>
+            <a:spLocks noGrp="1"/>
+          </p:cNvSpPr>
+          <p:nvPr>
+            <p:ph type="title"/>
+          </p:nvPr>
+        </p:nvSpPr>
+        <p:spPr/>
+        <p:txBody>
+          <a:bodyPr/>
+          <a:lstStyle/>
+          <a:p>
+            <a:r>
+              <a:rPr lang="en-US" dirty="0" smtClean="0"/>
+              <a:t>PHP.NET Apps</a:t>
+            </a:r>
+            <a:endParaRPr lang="en-US" dirty="0"/>
+          </a:p>
+        </p:txBody>
+      </p:sp>
+    </p:spTree>
+    <p:extLst>
+      <p:ext uri="{BB962C8B-B14F-4D97-AF65-F5344CB8AC3E}">
+        <p14:creationId xmlns:p14="http://schemas.microsoft.com/office/powerpoint/2010/main" val="2000895252"/>
+      </p:ext>
+    </p:extLst>
+  </p:cSld>
+  <p:clrMapOvr>
+    <a:masterClrMapping/>
+  </p:clrMapOvr>
+  <p:timing>
+    <p:tnLst>
+      <p:par>
+        <p:cTn id="1" dur="indefinite" restart="never" nodeType="tmRoot"/>
+      </p:par>
+    </p:tnLst>
+  </p:timing>
+</p:sld>
+</file>
+
+<file path=ppt/slides/slide2.xml><?xml version="1.0" encoding="utf-8"?>
+<p:sld xmlns:a="http://schemas.openxmlformats.org/drawingml/2006/main" xmlns:r="http://schemas.openxmlformats.org/officeDocument/2006/relationships" xmlns:p="http://schemas.openxmlformats.org/presentationml/2006/main">
+  <p:cSld>
+    <p:spTree>
+      <p:nvGrpSpPr>
+        <p:cNvPr id="1" name=""/>
+        <p:cNvGrpSpPr/>
+        <p:nvPr/>
+      </p:nvGrpSpPr>
+      <p:grpSpPr>
+        <a:xfrm>
+          <a:off x="0" y="0"/>
+          <a:ext cx="0" cy="0"/>
+          <a:chOff x="0" y="0"/>
+          <a:chExt cx="0" cy="0"/>
+        </a:xfrm>
+      </p:grpSpPr>
+      <p:sp>
+        <p:nvSpPr>
+          <p:cNvPr id="2" name="标题 1"/>
+          <p:cNvSpPr>
+            <a:spLocks noGrp="1"/>
+          </p:cNvSpPr>
+          <p:nvPr>
+            <p:ph type="title"/>
+          </p:nvPr>
+        </p:nvSpPr>
+        <p:spPr/>
+        <p:txBody>
+          <a:bodyPr/>
+          <a:lstStyle/>
+          <a:p>
+            <a:r>
+              <a:rPr lang="en-US" dirty="0" smtClean="0"/>
+              <a:t>Project Manager</a:t>
+            </a:r>
+            <a:endParaRPr lang="en-US" dirty="0"/>
+          </a:p>
+        </p:txBody>
+      </p:sp>
+      <p:sp>
+        <p:nvSpPr>
+          <p:cNvPr id="4" name="矩形 3"/>
           <p:cNvSpPr/>
           <p:nvPr/>
         </p:nvSpPr>
         <p:spPr>
           <a:xfrm>
-            <a:off x="3355912" y="1038810"/>
-            <a:ext cx="1374710" cy="510073"/>
+            <a:off x="987228" y="1690688"/>
+            <a:ext cx="3867993" cy="4685836"/>
           </a:xfrm>
           <a:prstGeom prst="rect">
             <a:avLst/>
@@ -3044,26 +3134,136 @@
           <a:lstStyle/>
           <a:p>
             <a:pPr algn="ctr"/>
-            <a:r>
-              <a:rPr lang="en-US" dirty="0" err="1" smtClean="0"/>
-              <a:t>fileManager</a:t>
-            </a:r>
-            <a:endParaRPr lang="en-US" dirty="0"/>
-          </a:p>
-        </p:txBody>
-      </p:sp>
-      <p:sp>
-        <p:nvSpPr>
-          <p:cNvPr id="6" name="右箭头 5"/>
+            <a:endParaRPr lang="en-US"/>
+          </a:p>
+        </p:txBody>
+      </p:sp>
+      <p:sp>
+        <p:nvSpPr>
+          <p:cNvPr id="5" name="矩形 4"/>
           <p:cNvSpPr/>
           <p:nvPr/>
         </p:nvSpPr>
         <p:spPr>
           <a:xfrm>
-            <a:off x="2452397" y="1038810"/>
-            <a:ext cx="696686" cy="510073"/>
-          </a:xfrm>
-          <a:prstGeom prst="rightArrow">
+            <a:off x="4867359" y="1690688"/>
+            <a:ext cx="6635469" cy="4685836"/>
+          </a:xfrm>
+          <a:prstGeom prst="rect">
+            <a:avLst/>
+          </a:prstGeom>
+        </p:spPr>
+        <p:style>
+          <a:lnRef idx="2">
+            <a:schemeClr val="accent6">
+              <a:shade val="50000"/>
+            </a:schemeClr>
+          </a:lnRef>
+          <a:fillRef idx="1">
+            <a:schemeClr val="accent6"/>
+          </a:fillRef>
+          <a:effectRef idx="0">
+            <a:schemeClr val="accent6"/>
+          </a:effectRef>
+          <a:fontRef idx="minor">
+            <a:schemeClr val="lt1"/>
+          </a:fontRef>
+        </p:style>
+        <p:txBody>
+          <a:bodyPr rtlCol="0" anchor="ctr"/>
+          <a:lstStyle/>
+          <a:p>
+            <a:pPr algn="ctr"/>
+            <a:endParaRPr lang="en-US" dirty="0"/>
+          </a:p>
+        </p:txBody>
+      </p:sp>
+      <p:sp>
+        <p:nvSpPr>
+          <p:cNvPr id="6" name="矩形 5"/>
+          <p:cNvSpPr/>
+          <p:nvPr/>
+        </p:nvSpPr>
+        <p:spPr>
+          <a:xfrm>
+            <a:off x="987228" y="1690688"/>
+            <a:ext cx="3867993" cy="801659"/>
+          </a:xfrm>
+          <a:prstGeom prst="rect">
+            <a:avLst/>
+          </a:prstGeom>
+        </p:spPr>
+        <p:style>
+          <a:lnRef idx="2">
+            <a:schemeClr val="accent6">
+              <a:shade val="50000"/>
+            </a:schemeClr>
+          </a:lnRef>
+          <a:fillRef idx="1">
+            <a:schemeClr val="accent6"/>
+          </a:fillRef>
+          <a:effectRef idx="0">
+            <a:schemeClr val="accent6"/>
+          </a:effectRef>
+          <a:fontRef idx="minor">
+            <a:schemeClr val="lt1"/>
+          </a:fontRef>
+        </p:style>
+        <p:txBody>
+          <a:bodyPr rtlCol="0" anchor="ctr"/>
+          <a:lstStyle/>
+          <a:p>
+            <a:pPr algn="ctr"/>
+            <a:r>
+              <a:rPr lang="en-US" dirty="0" smtClean="0"/>
+              <a:t>Project1</a:t>
+            </a:r>
+            <a:endParaRPr lang="en-US" dirty="0"/>
+          </a:p>
+        </p:txBody>
+      </p:sp>
+      <p:sp>
+        <p:nvSpPr>
+          <p:cNvPr id="7" name="文本框 6"/>
+          <p:cNvSpPr txBox="1"/>
+          <p:nvPr/>
+        </p:nvSpPr>
+        <p:spPr>
+          <a:xfrm>
+            <a:off x="5153786" y="1906851"/>
+            <a:ext cx="1884427" cy="369332"/>
+          </a:xfrm>
+          <a:prstGeom prst="rect">
+            <a:avLst/>
+          </a:prstGeom>
+          <a:noFill/>
+        </p:spPr>
+        <p:txBody>
+          <a:bodyPr wrap="none" rtlCol="0">
+            <a:spAutoFit/>
+          </a:bodyPr>
+          <a:lstStyle/>
+          <a:p>
+            <a:r>
+              <a:rPr lang="en-US" dirty="0" smtClean="0"/>
+              <a:t>Project 1 Property</a:t>
+            </a:r>
+            <a:endParaRPr lang="en-US" dirty="0"/>
+          </a:p>
+        </p:txBody>
+      </p:sp>
+      <p:sp>
+        <p:nvSpPr>
+          <p:cNvPr id="8" name="矩形 7"/>
+          <p:cNvSpPr/>
+          <p:nvPr/>
+        </p:nvSpPr>
+        <p:spPr>
+          <a:xfrm>
+            <a:off x="5907522" y="3798935"/>
+            <a:ext cx="1942089" cy="925361"/>
+          </a:xfrm>
+          <a:prstGeom prst="rect">
             <a:avLst/>
           </a:prstGeom>
         </p:spPr>
@@ -3088,14 +3288,684 @@
           <a:lstStyle/>
           <a:p>
             <a:pPr algn="ctr"/>
-            <a:endParaRPr lang="en-US"/>
+            <a:r>
+              <a:rPr lang="en-US" dirty="0" smtClean="0"/>
+              <a:t>Manage files</a:t>
+            </a:r>
+            <a:endParaRPr lang="en-US" dirty="0"/>
+          </a:p>
+        </p:txBody>
+      </p:sp>
+      <p:sp>
+        <p:nvSpPr>
+          <p:cNvPr id="9" name="矩形 8"/>
+          <p:cNvSpPr/>
+          <p:nvPr/>
+        </p:nvSpPr>
+        <p:spPr>
+          <a:xfrm>
+            <a:off x="8889774" y="3798936"/>
+            <a:ext cx="1767437" cy="925361"/>
+          </a:xfrm>
+          <a:prstGeom prst="rect">
+            <a:avLst/>
+          </a:prstGeom>
+        </p:spPr>
+        <p:style>
+          <a:lnRef idx="2">
+            <a:schemeClr val="accent1">
+              <a:shade val="50000"/>
+            </a:schemeClr>
+          </a:lnRef>
+          <a:fillRef idx="1">
+            <a:schemeClr val="accent1"/>
+          </a:fillRef>
+          <a:effectRef idx="0">
+            <a:schemeClr val="accent1"/>
+          </a:effectRef>
+          <a:fontRef idx="minor">
+            <a:schemeClr val="lt1"/>
+          </a:fontRef>
+        </p:style>
+        <p:txBody>
+          <a:bodyPr rtlCol="0" anchor="ctr"/>
+          <a:lstStyle/>
+          <a:p>
+            <a:pPr algn="ctr"/>
+            <a:r>
+              <a:rPr lang="en-US" dirty="0" smtClean="0"/>
+              <a:t>Data analysis</a:t>
+            </a:r>
+            <a:endParaRPr lang="en-US" dirty="0"/>
+          </a:p>
+        </p:txBody>
+      </p:sp>
+      <p:sp>
+        <p:nvSpPr>
+          <p:cNvPr id="10" name="矩形 9"/>
+          <p:cNvSpPr/>
+          <p:nvPr/>
+        </p:nvSpPr>
+        <p:spPr>
+          <a:xfrm>
+            <a:off x="5588898" y="5162799"/>
+            <a:ext cx="2826819" cy="275050"/>
+          </a:xfrm>
+          <a:prstGeom prst="rect">
+            <a:avLst/>
+          </a:prstGeom>
+        </p:spPr>
+        <p:style>
+          <a:lnRef idx="2">
+            <a:schemeClr val="accent1">
+              <a:shade val="50000"/>
+            </a:schemeClr>
+          </a:lnRef>
+          <a:fillRef idx="1">
+            <a:schemeClr val="accent1"/>
+          </a:fillRef>
+          <a:effectRef idx="0">
+            <a:schemeClr val="accent1"/>
+          </a:effectRef>
+          <a:fontRef idx="minor">
+            <a:schemeClr val="lt1"/>
+          </a:fontRef>
+        </p:style>
+        <p:txBody>
+          <a:bodyPr rtlCol="0" anchor="ctr"/>
+          <a:lstStyle/>
+          <a:p>
+            <a:pPr algn="ctr"/>
+            <a:r>
+              <a:rPr lang="en-US" dirty="0" smtClean="0"/>
+              <a:t>Export report</a:t>
+            </a:r>
+            <a:endParaRPr lang="en-US" dirty="0"/>
+          </a:p>
+        </p:txBody>
+      </p:sp>
+      <p:sp>
+        <p:nvSpPr>
+          <p:cNvPr id="11" name="矩形 10"/>
+          <p:cNvSpPr/>
+          <p:nvPr/>
+        </p:nvSpPr>
+        <p:spPr>
+          <a:xfrm>
+            <a:off x="5588897" y="5732111"/>
+            <a:ext cx="2826819" cy="275050"/>
+          </a:xfrm>
+          <a:prstGeom prst="rect">
+            <a:avLst/>
+          </a:prstGeom>
+        </p:spPr>
+        <p:style>
+          <a:lnRef idx="2">
+            <a:schemeClr val="accent1">
+              <a:shade val="50000"/>
+            </a:schemeClr>
+          </a:lnRef>
+          <a:fillRef idx="1">
+            <a:schemeClr val="accent1"/>
+          </a:fillRef>
+          <a:effectRef idx="0">
+            <a:schemeClr val="accent1"/>
+          </a:effectRef>
+          <a:fontRef idx="minor">
+            <a:schemeClr val="lt1"/>
+          </a:fontRef>
+        </p:style>
+        <p:txBody>
+          <a:bodyPr rtlCol="0" anchor="ctr"/>
+          <a:lstStyle/>
+          <a:p>
+            <a:pPr algn="ctr"/>
+            <a:r>
+              <a:rPr lang="en-US" dirty="0" smtClean="0"/>
+              <a:t>Download report.pdf</a:t>
+            </a:r>
+            <a:endParaRPr lang="en-US" dirty="0"/>
+          </a:p>
+        </p:txBody>
+      </p:sp>
+      <p:sp>
+        <p:nvSpPr>
+          <p:cNvPr id="12" name="矩形 11"/>
+          <p:cNvSpPr/>
+          <p:nvPr/>
+        </p:nvSpPr>
+        <p:spPr>
+          <a:xfrm>
+            <a:off x="999366" y="2615421"/>
+            <a:ext cx="3867993" cy="801659"/>
+          </a:xfrm>
+          <a:prstGeom prst="rect">
+            <a:avLst/>
+          </a:prstGeom>
+        </p:spPr>
+        <p:style>
+          <a:lnRef idx="2">
+            <a:schemeClr val="accent5">
+              <a:shade val="50000"/>
+            </a:schemeClr>
+          </a:lnRef>
+          <a:fillRef idx="1">
+            <a:schemeClr val="accent5"/>
+          </a:fillRef>
+          <a:effectRef idx="0">
+            <a:schemeClr val="accent5"/>
+          </a:effectRef>
+          <a:fontRef idx="minor">
+            <a:schemeClr val="lt1"/>
+          </a:fontRef>
+        </p:style>
+        <p:txBody>
+          <a:bodyPr rtlCol="0" anchor="ctr"/>
+          <a:lstStyle/>
+          <a:p>
+            <a:pPr algn="ctr"/>
+            <a:r>
+              <a:rPr lang="en-US" dirty="0" smtClean="0"/>
+              <a:t>Project2</a:t>
+            </a:r>
+            <a:endParaRPr lang="en-US" dirty="0"/>
+          </a:p>
+        </p:txBody>
+      </p:sp>
+      <p:sp>
+        <p:nvSpPr>
+          <p:cNvPr id="13" name="矩形 12"/>
+          <p:cNvSpPr/>
+          <p:nvPr/>
+        </p:nvSpPr>
+        <p:spPr>
+          <a:xfrm>
+            <a:off x="999365" y="3540154"/>
+            <a:ext cx="3867993" cy="801659"/>
+          </a:xfrm>
+          <a:prstGeom prst="rect">
+            <a:avLst/>
+          </a:prstGeom>
+        </p:spPr>
+        <p:style>
+          <a:lnRef idx="2">
+            <a:schemeClr val="accent5">
+              <a:shade val="50000"/>
+            </a:schemeClr>
+          </a:lnRef>
+          <a:fillRef idx="1">
+            <a:schemeClr val="accent5"/>
+          </a:fillRef>
+          <a:effectRef idx="0">
+            <a:schemeClr val="accent5"/>
+          </a:effectRef>
+          <a:fontRef idx="minor">
+            <a:schemeClr val="lt1"/>
+          </a:fontRef>
+        </p:style>
+        <p:txBody>
+          <a:bodyPr rtlCol="0" anchor="ctr"/>
+          <a:lstStyle/>
+          <a:p>
+            <a:pPr algn="ctr"/>
+            <a:r>
+              <a:rPr lang="en-US" dirty="0" smtClean="0"/>
+              <a:t>Project3</a:t>
+            </a:r>
+            <a:endParaRPr lang="en-US" dirty="0"/>
           </a:p>
         </p:txBody>
       </p:sp>
     </p:spTree>
     <p:extLst>
       <p:ext uri="{BB962C8B-B14F-4D97-AF65-F5344CB8AC3E}">
-        <p14:creationId xmlns:p14="http://schemas.microsoft.com/office/powerpoint/2010/main" val="2000895252"/>
+        <p14:creationId xmlns:p14="http://schemas.microsoft.com/office/powerpoint/2010/main" val="4077543710"/>
+      </p:ext>
+    </p:extLst>
+  </p:cSld>
+  <p:clrMapOvr>
+    <a:masterClrMapping/>
+  </p:clrMapOvr>
+  <p:timing>
+    <p:tnLst>
+      <p:par>
+        <p:cTn id="1" dur="indefinite" restart="never" nodeType="tmRoot"/>
+      </p:par>
+    </p:tnLst>
+  </p:timing>
+</p:sld>
+</file>
+
+<file path=ppt/slides/slide3.xml><?xml version="1.0" encoding="utf-8"?>
+<p:sld xmlns:a="http://schemas.openxmlformats.org/drawingml/2006/main" xmlns:r="http://schemas.openxmlformats.org/officeDocument/2006/relationships" xmlns:p="http://schemas.openxmlformats.org/presentationml/2006/main">
+  <p:cSld>
+    <p:spTree>
+      <p:nvGrpSpPr>
+        <p:cNvPr id="1" name=""/>
+        <p:cNvGrpSpPr/>
+        <p:nvPr/>
+      </p:nvGrpSpPr>
+      <p:grpSpPr>
+        <a:xfrm>
+          <a:off x="0" y="0"/>
+          <a:ext cx="0" cy="0"/>
+          <a:chOff x="0" y="0"/>
+          <a:chExt cx="0" cy="0"/>
+        </a:xfrm>
+      </p:grpSpPr>
+      <p:sp>
+        <p:nvSpPr>
+          <p:cNvPr id="2" name="标题 1"/>
+          <p:cNvSpPr>
+            <a:spLocks noGrp="1"/>
+          </p:cNvSpPr>
+          <p:nvPr>
+            <p:ph type="title"/>
+          </p:nvPr>
+        </p:nvSpPr>
+        <p:spPr/>
+        <p:txBody>
+          <a:bodyPr/>
+          <a:lstStyle/>
+          <a:p>
+            <a:r>
+              <a:rPr lang="en-US" altLang="zh-CN" dirty="0" smtClean="0"/>
+              <a:t>Data Analysis Tools</a:t>
+            </a:r>
+            <a:endParaRPr lang="en-US" dirty="0"/>
+          </a:p>
+        </p:txBody>
+      </p:sp>
+      <p:sp>
+        <p:nvSpPr>
+          <p:cNvPr id="4" name="矩形 3"/>
+          <p:cNvSpPr/>
+          <p:nvPr/>
+        </p:nvSpPr>
+        <p:spPr>
+          <a:xfrm>
+            <a:off x="838200" y="1586039"/>
+            <a:ext cx="1937368" cy="4976602"/>
+          </a:xfrm>
+          <a:prstGeom prst="rect">
+            <a:avLst/>
+          </a:prstGeom>
+        </p:spPr>
+        <p:style>
+          <a:lnRef idx="2">
+            <a:schemeClr val="accent1">
+              <a:shade val="50000"/>
+            </a:schemeClr>
+          </a:lnRef>
+          <a:fillRef idx="1">
+            <a:schemeClr val="accent1"/>
+          </a:fillRef>
+          <a:effectRef idx="0">
+            <a:schemeClr val="accent1"/>
+          </a:effectRef>
+          <a:fontRef idx="minor">
+            <a:schemeClr val="lt1"/>
+          </a:fontRef>
+        </p:style>
+        <p:txBody>
+          <a:bodyPr rtlCol="0" anchor="ctr"/>
+          <a:lstStyle/>
+          <a:p>
+            <a:pPr algn="ctr"/>
+            <a:endParaRPr lang="en-US"/>
+          </a:p>
+        </p:txBody>
+      </p:sp>
+      <p:sp>
+        <p:nvSpPr>
+          <p:cNvPr id="5" name="矩形 4"/>
+          <p:cNvSpPr/>
+          <p:nvPr/>
+        </p:nvSpPr>
+        <p:spPr>
+          <a:xfrm>
+            <a:off x="3002145" y="2468071"/>
+            <a:ext cx="9022620" cy="4094570"/>
+          </a:xfrm>
+          <a:prstGeom prst="rect">
+            <a:avLst/>
+          </a:prstGeom>
+        </p:spPr>
+        <p:style>
+          <a:lnRef idx="2">
+            <a:schemeClr val="accent1">
+              <a:shade val="50000"/>
+            </a:schemeClr>
+          </a:lnRef>
+          <a:fillRef idx="1">
+            <a:schemeClr val="accent1"/>
+          </a:fillRef>
+          <a:effectRef idx="0">
+            <a:schemeClr val="accent1"/>
+          </a:effectRef>
+          <a:fontRef idx="minor">
+            <a:schemeClr val="lt1"/>
+          </a:fontRef>
+        </p:style>
+        <p:txBody>
+          <a:bodyPr rtlCol="0" anchor="ctr"/>
+          <a:lstStyle/>
+          <a:p>
+            <a:pPr algn="ctr"/>
+            <a:endParaRPr lang="en-US"/>
+          </a:p>
+        </p:txBody>
+      </p:sp>
+      <p:sp>
+        <p:nvSpPr>
+          <p:cNvPr id="6" name="矩形 5"/>
+          <p:cNvSpPr/>
+          <p:nvPr/>
+        </p:nvSpPr>
+        <p:spPr>
+          <a:xfrm>
+            <a:off x="3002145" y="1586039"/>
+            <a:ext cx="1788340" cy="801111"/>
+          </a:xfrm>
+          <a:prstGeom prst="rect">
+            <a:avLst/>
+          </a:prstGeom>
+        </p:spPr>
+        <p:style>
+          <a:lnRef idx="2">
+            <a:schemeClr val="accent1">
+              <a:shade val="50000"/>
+            </a:schemeClr>
+          </a:lnRef>
+          <a:fillRef idx="1">
+            <a:schemeClr val="accent1"/>
+          </a:fillRef>
+          <a:effectRef idx="0">
+            <a:schemeClr val="accent1"/>
+          </a:effectRef>
+          <a:fontRef idx="minor">
+            <a:schemeClr val="lt1"/>
+          </a:fontRef>
+        </p:style>
+        <p:txBody>
+          <a:bodyPr rtlCol="0" anchor="ctr"/>
+          <a:lstStyle/>
+          <a:p>
+            <a:pPr algn="ctr"/>
+            <a:r>
+              <a:rPr lang="en-US" dirty="0" smtClean="0"/>
+              <a:t>analysis</a:t>
+            </a:r>
+            <a:endParaRPr lang="en-US" dirty="0"/>
+          </a:p>
+        </p:txBody>
+      </p:sp>
+      <p:sp>
+        <p:nvSpPr>
+          <p:cNvPr id="7" name="矩形 6"/>
+          <p:cNvSpPr/>
+          <p:nvPr/>
+        </p:nvSpPr>
+        <p:spPr>
+          <a:xfrm>
+            <a:off x="4918609" y="1586038"/>
+            <a:ext cx="1788340" cy="801111"/>
+          </a:xfrm>
+          <a:prstGeom prst="rect">
+            <a:avLst/>
+          </a:prstGeom>
+        </p:spPr>
+        <p:style>
+          <a:lnRef idx="2">
+            <a:schemeClr val="accent1">
+              <a:shade val="50000"/>
+            </a:schemeClr>
+          </a:lnRef>
+          <a:fillRef idx="1">
+            <a:schemeClr val="accent1"/>
+          </a:fillRef>
+          <a:effectRef idx="0">
+            <a:schemeClr val="accent1"/>
+          </a:effectRef>
+          <a:fontRef idx="minor">
+            <a:schemeClr val="lt1"/>
+          </a:fontRef>
+        </p:style>
+        <p:txBody>
+          <a:bodyPr rtlCol="0" anchor="ctr"/>
+          <a:lstStyle/>
+          <a:p>
+            <a:pPr algn="ctr"/>
+            <a:r>
+              <a:rPr lang="en-US" dirty="0" smtClean="0"/>
+              <a:t>report</a:t>
+            </a:r>
+            <a:endParaRPr lang="en-US" dirty="0"/>
+          </a:p>
+        </p:txBody>
+      </p:sp>
+      <p:sp>
+        <p:nvSpPr>
+          <p:cNvPr id="8" name="矩形 7"/>
+          <p:cNvSpPr/>
+          <p:nvPr/>
+        </p:nvSpPr>
+        <p:spPr>
+          <a:xfrm>
+            <a:off x="3244906" y="2767476"/>
+            <a:ext cx="995321" cy="323682"/>
+          </a:xfrm>
+          <a:prstGeom prst="rect">
+            <a:avLst/>
+          </a:prstGeom>
+        </p:spPr>
+        <p:style>
+          <a:lnRef idx="1">
+            <a:schemeClr val="accent6"/>
+          </a:lnRef>
+          <a:fillRef idx="3">
+            <a:schemeClr val="accent6"/>
+          </a:fillRef>
+          <a:effectRef idx="2">
+            <a:schemeClr val="accent6"/>
+          </a:effectRef>
+          <a:fontRef idx="minor">
+            <a:schemeClr val="lt1"/>
+          </a:fontRef>
+        </p:style>
+        <p:txBody>
+          <a:bodyPr rtlCol="0" anchor="ctr"/>
+          <a:lstStyle/>
+          <a:p>
+            <a:pPr algn="ctr"/>
+            <a:r>
+              <a:rPr lang="en-US" dirty="0" smtClean="0"/>
+              <a:t>run</a:t>
+            </a:r>
+            <a:endParaRPr lang="en-US" dirty="0"/>
+          </a:p>
+        </p:txBody>
+      </p:sp>
+      <p:sp>
+        <p:nvSpPr>
+          <p:cNvPr id="9" name="矩形 8"/>
+          <p:cNvSpPr/>
+          <p:nvPr/>
+        </p:nvSpPr>
+        <p:spPr>
+          <a:xfrm>
+            <a:off x="1043873" y="1796432"/>
+            <a:ext cx="1537486" cy="396510"/>
+          </a:xfrm>
+          <a:prstGeom prst="rect">
+            <a:avLst/>
+          </a:prstGeom>
+        </p:spPr>
+        <p:style>
+          <a:lnRef idx="2">
+            <a:schemeClr val="accent6">
+              <a:shade val="50000"/>
+            </a:schemeClr>
+          </a:lnRef>
+          <a:fillRef idx="1">
+            <a:schemeClr val="accent6"/>
+          </a:fillRef>
+          <a:effectRef idx="0">
+            <a:schemeClr val="accent6"/>
+          </a:effectRef>
+          <a:fontRef idx="minor">
+            <a:schemeClr val="lt1"/>
+          </a:fontRef>
+        </p:style>
+        <p:txBody>
+          <a:bodyPr rtlCol="0" anchor="ctr"/>
+          <a:lstStyle/>
+          <a:p>
+            <a:pPr algn="ctr"/>
+            <a:r>
+              <a:rPr lang="en-US" dirty="0" smtClean="0"/>
+              <a:t>Analysis 1</a:t>
+            </a:r>
+            <a:endParaRPr lang="en-US" dirty="0"/>
+          </a:p>
+        </p:txBody>
+      </p:sp>
+      <p:sp>
+        <p:nvSpPr>
+          <p:cNvPr id="10" name="矩形 9"/>
+          <p:cNvSpPr/>
+          <p:nvPr/>
+        </p:nvSpPr>
+        <p:spPr>
+          <a:xfrm>
+            <a:off x="1043873" y="2370966"/>
+            <a:ext cx="1537486" cy="396510"/>
+          </a:xfrm>
+          <a:prstGeom prst="rect">
+            <a:avLst/>
+          </a:prstGeom>
+        </p:spPr>
+        <p:style>
+          <a:lnRef idx="2">
+            <a:schemeClr val="accent6">
+              <a:shade val="50000"/>
+            </a:schemeClr>
+          </a:lnRef>
+          <a:fillRef idx="1">
+            <a:schemeClr val="accent6"/>
+          </a:fillRef>
+          <a:effectRef idx="0">
+            <a:schemeClr val="accent6"/>
+          </a:effectRef>
+          <a:fontRef idx="minor">
+            <a:schemeClr val="lt1"/>
+          </a:fontRef>
+        </p:style>
+        <p:txBody>
+          <a:bodyPr rtlCol="0" anchor="ctr"/>
+          <a:lstStyle/>
+          <a:p>
+            <a:pPr algn="ctr"/>
+            <a:r>
+              <a:rPr lang="en-US" dirty="0" smtClean="0"/>
+              <a:t>Analysis 2</a:t>
+            </a:r>
+            <a:endParaRPr lang="en-US" dirty="0"/>
+          </a:p>
+        </p:txBody>
+      </p:sp>
+      <p:sp>
+        <p:nvSpPr>
+          <p:cNvPr id="11" name="矩形 10"/>
+          <p:cNvSpPr/>
+          <p:nvPr/>
+        </p:nvSpPr>
+        <p:spPr>
+          <a:xfrm>
+            <a:off x="1043873" y="2929317"/>
+            <a:ext cx="1537486" cy="396510"/>
+          </a:xfrm>
+          <a:prstGeom prst="rect">
+            <a:avLst/>
+          </a:prstGeom>
+        </p:spPr>
+        <p:style>
+          <a:lnRef idx="2">
+            <a:schemeClr val="accent6">
+              <a:shade val="50000"/>
+            </a:schemeClr>
+          </a:lnRef>
+          <a:fillRef idx="1">
+            <a:schemeClr val="accent6"/>
+          </a:fillRef>
+          <a:effectRef idx="0">
+            <a:schemeClr val="accent6"/>
+          </a:effectRef>
+          <a:fontRef idx="minor">
+            <a:schemeClr val="lt1"/>
+          </a:fontRef>
+        </p:style>
+        <p:txBody>
+          <a:bodyPr rtlCol="0" anchor="ctr"/>
+          <a:lstStyle/>
+          <a:p>
+            <a:pPr algn="ctr"/>
+            <a:r>
+              <a:rPr lang="en-US" dirty="0" smtClean="0"/>
+              <a:t>Analysis 3</a:t>
+            </a:r>
+            <a:endParaRPr lang="en-US" dirty="0"/>
+          </a:p>
+        </p:txBody>
+      </p:sp>
+      <p:sp>
+        <p:nvSpPr>
+          <p:cNvPr id="12" name="矩形 11"/>
+          <p:cNvSpPr/>
+          <p:nvPr/>
+        </p:nvSpPr>
+        <p:spPr>
+          <a:xfrm>
+            <a:off x="1043873" y="3495761"/>
+            <a:ext cx="1537486" cy="396510"/>
+          </a:xfrm>
+          <a:prstGeom prst="rect">
+            <a:avLst/>
+          </a:prstGeom>
+        </p:spPr>
+        <p:style>
+          <a:lnRef idx="2">
+            <a:schemeClr val="accent6">
+              <a:shade val="50000"/>
+            </a:schemeClr>
+          </a:lnRef>
+          <a:fillRef idx="1">
+            <a:schemeClr val="accent6"/>
+          </a:fillRef>
+          <a:effectRef idx="0">
+            <a:schemeClr val="accent6"/>
+          </a:effectRef>
+          <a:fontRef idx="minor">
+            <a:schemeClr val="lt1"/>
+          </a:fontRef>
+        </p:style>
+        <p:txBody>
+          <a:bodyPr rtlCol="0" anchor="ctr"/>
+          <a:lstStyle/>
+          <a:p>
+            <a:pPr algn="ctr"/>
+            <a:r>
+              <a:rPr lang="en-US" dirty="0" smtClean="0"/>
+              <a:t>Analysis 4</a:t>
+            </a:r>
+            <a:endParaRPr lang="en-US" dirty="0"/>
+          </a:p>
+        </p:txBody>
+      </p:sp>
+    </p:spTree>
+    <p:extLst>
+      <p:ext uri="{BB962C8B-B14F-4D97-AF65-F5344CB8AC3E}">
+        <p14:creationId xmlns:p14="http://schemas.microsoft.com/office/powerpoint/2010/main" val="3692065928"/>
       </p:ext>
     </p:extLst>
   </p:cSld>

</xml_diff>